<commit_message>
reoganized popmap_all.js into different functions of initiate,wrangledata,updatevis;
</commit_message>
<xml_diff>
--- a/Ing..Process Book - MileStone.pptx
+++ b/Ing..Process Book - MileStone.pptx
@@ -26,8 +26,9 @@
     <p:sldId id="278" r:id="rId20"/>
     <p:sldId id="279" r:id="rId21"/>
     <p:sldId id="283" r:id="rId22"/>
-    <p:sldId id="280" r:id="rId23"/>
-    <p:sldId id="282" r:id="rId24"/>
+    <p:sldId id="284" r:id="rId23"/>
+    <p:sldId id="280" r:id="rId24"/>
+    <p:sldId id="282" r:id="rId25"/>
   </p:sldIdLst>
   <p:sldSz cx="12192000" cy="6858000"/>
   <p:notesSz cx="6858000" cy="9144000"/>
@@ -921,11 +922,11 @@
         </c:dLbls>
         <c:gapWidth val="219"/>
         <c:overlap val="-27"/>
-        <c:axId val="248142840"/>
-        <c:axId val="248139704"/>
+        <c:axId val="244634480"/>
+        <c:axId val="327502928"/>
       </c:barChart>
       <c:catAx>
-        <c:axId val="248142840"/>
+        <c:axId val="244634480"/>
         <c:scaling>
           <c:orientation val="minMax"/>
         </c:scaling>
@@ -968,7 +969,7 @@
             <a:endParaRPr lang="en-US"/>
           </a:p>
         </c:txPr>
-        <c:crossAx val="248139704"/>
+        <c:crossAx val="327502928"/>
         <c:crosses val="autoZero"/>
         <c:auto val="1"/>
         <c:lblAlgn val="ctr"/>
@@ -976,7 +977,7 @@
         <c:noMultiLvlLbl val="0"/>
       </c:catAx>
       <c:valAx>
-        <c:axId val="248139704"/>
+        <c:axId val="327502928"/>
         <c:scaling>
           <c:orientation val="minMax"/>
         </c:scaling>
@@ -1027,7 +1028,7 @@
             <a:endParaRPr lang="en-US"/>
           </a:p>
         </c:txPr>
-        <c:crossAx val="248142840"/>
+        <c:crossAx val="244634480"/>
         <c:crosses val="autoZero"/>
         <c:crossBetween val="between"/>
       </c:valAx>
@@ -1771,7 +1772,7 @@
           <a:p>
             <a:fld id="{8AF18C45-445E-4B54-B592-3813387BCB03}" type="datetimeFigureOut">
               <a:rPr lang="en-US" smtClean="0"/>
-              <a:t>4/23/2015</a:t>
+              <a:t>4/25/2015</a:t>
             </a:fld>
             <a:endParaRPr lang="en-US"/>
           </a:p>
@@ -1941,7 +1942,7 @@
           <a:p>
             <a:fld id="{8AF18C45-445E-4B54-B592-3813387BCB03}" type="datetimeFigureOut">
               <a:rPr lang="en-US" smtClean="0"/>
-              <a:t>4/23/2015</a:t>
+              <a:t>4/25/2015</a:t>
             </a:fld>
             <a:endParaRPr lang="en-US"/>
           </a:p>
@@ -2121,7 +2122,7 @@
           <a:p>
             <a:fld id="{8AF18C45-445E-4B54-B592-3813387BCB03}" type="datetimeFigureOut">
               <a:rPr lang="en-US" smtClean="0"/>
-              <a:t>4/23/2015</a:t>
+              <a:t>4/25/2015</a:t>
             </a:fld>
             <a:endParaRPr lang="en-US"/>
           </a:p>
@@ -2291,7 +2292,7 @@
           <a:p>
             <a:fld id="{8AF18C45-445E-4B54-B592-3813387BCB03}" type="datetimeFigureOut">
               <a:rPr lang="en-US" smtClean="0"/>
-              <a:t>4/23/2015</a:t>
+              <a:t>4/25/2015</a:t>
             </a:fld>
             <a:endParaRPr lang="en-US"/>
           </a:p>
@@ -2537,7 +2538,7 @@
           <a:p>
             <a:fld id="{8AF18C45-445E-4B54-B592-3813387BCB03}" type="datetimeFigureOut">
               <a:rPr lang="en-US" smtClean="0"/>
-              <a:t>4/23/2015</a:t>
+              <a:t>4/25/2015</a:t>
             </a:fld>
             <a:endParaRPr lang="en-US"/>
           </a:p>
@@ -2769,7 +2770,7 @@
           <a:p>
             <a:fld id="{8AF18C45-445E-4B54-B592-3813387BCB03}" type="datetimeFigureOut">
               <a:rPr lang="en-US" smtClean="0"/>
-              <a:t>4/23/2015</a:t>
+              <a:t>4/25/2015</a:t>
             </a:fld>
             <a:endParaRPr lang="en-US"/>
           </a:p>
@@ -3136,7 +3137,7 @@
           <a:p>
             <a:fld id="{8AF18C45-445E-4B54-B592-3813387BCB03}" type="datetimeFigureOut">
               <a:rPr lang="en-US" smtClean="0"/>
-              <a:t>4/23/2015</a:t>
+              <a:t>4/25/2015</a:t>
             </a:fld>
             <a:endParaRPr lang="en-US"/>
           </a:p>
@@ -3254,7 +3255,7 @@
           <a:p>
             <a:fld id="{8AF18C45-445E-4B54-B592-3813387BCB03}" type="datetimeFigureOut">
               <a:rPr lang="en-US" smtClean="0"/>
-              <a:t>4/23/2015</a:t>
+              <a:t>4/25/2015</a:t>
             </a:fld>
             <a:endParaRPr lang="en-US"/>
           </a:p>
@@ -3349,7 +3350,7 @@
           <a:p>
             <a:fld id="{8AF18C45-445E-4B54-B592-3813387BCB03}" type="datetimeFigureOut">
               <a:rPr lang="en-US" smtClean="0"/>
-              <a:t>4/23/2015</a:t>
+              <a:t>4/25/2015</a:t>
             </a:fld>
             <a:endParaRPr lang="en-US"/>
           </a:p>
@@ -3626,7 +3627,7 @@
           <a:p>
             <a:fld id="{8AF18C45-445E-4B54-B592-3813387BCB03}" type="datetimeFigureOut">
               <a:rPr lang="en-US" smtClean="0"/>
-              <a:t>4/23/2015</a:t>
+              <a:t>4/25/2015</a:t>
             </a:fld>
             <a:endParaRPr lang="en-US"/>
           </a:p>
@@ -3879,7 +3880,7 @@
           <a:p>
             <a:fld id="{8AF18C45-445E-4B54-B592-3813387BCB03}" type="datetimeFigureOut">
               <a:rPr lang="en-US" smtClean="0"/>
-              <a:t>4/23/2015</a:t>
+              <a:t>4/25/2015</a:t>
             </a:fld>
             <a:endParaRPr lang="en-US"/>
           </a:p>
@@ -4092,7 +4093,7 @@
           <a:p>
             <a:fld id="{8AF18C45-445E-4B54-B592-3813387BCB03}" type="datetimeFigureOut">
               <a:rPr lang="en-US" smtClean="0"/>
-              <a:t>4/23/2015</a:t>
+              <a:t>4/25/2015</a:t>
             </a:fld>
             <a:endParaRPr lang="en-US"/>
           </a:p>
@@ -7196,6 +7197,67 @@
           <a:chExt cx="0" cy="0"/>
         </a:xfrm>
       </p:grpSpPr>
+      <p:pic>
+        <p:nvPicPr>
+          <p:cNvPr id="6" name="Picture 5"/>
+          <p:cNvPicPr>
+            <a:picLocks noChangeAspect="1"/>
+          </p:cNvPicPr>
+          <p:nvPr/>
+        </p:nvPicPr>
+        <p:blipFill>
+          <a:blip r:embed="rId2"/>
+          <a:stretch>
+            <a:fillRect/>
+          </a:stretch>
+        </p:blipFill>
+        <p:spPr>
+          <a:xfrm>
+            <a:off x="765810" y="134753"/>
+            <a:ext cx="10312707" cy="6072237"/>
+          </a:xfrm>
+          <a:prstGeom prst="rect">
+            <a:avLst/>
+          </a:prstGeom>
+        </p:spPr>
+      </p:pic>
+    </p:spTree>
+    <p:extLst>
+      <p:ext uri="{BB962C8B-B14F-4D97-AF65-F5344CB8AC3E}">
+        <p14:creationId xmlns:p14="http://schemas.microsoft.com/office/powerpoint/2010/main" val="2982902558"/>
+      </p:ext>
+    </p:extLst>
+  </p:cSld>
+  <p:clrMapOvr>
+    <a:masterClrMapping/>
+  </p:clrMapOvr>
+  <p:timing>
+    <p:tnLst>
+      <p:par>
+        <p:cTn id="1" dur="indefinite" restart="never" nodeType="tmRoot"/>
+      </p:par>
+    </p:tnLst>
+  </p:timing>
+</p:sld>
+</file>
+
+<file path=ppt/slides/slide23.xml><?xml version="1.0" encoding="utf-8"?>
+<p:sld xmlns:a="http://schemas.openxmlformats.org/drawingml/2006/main" xmlns:r="http://schemas.openxmlformats.org/officeDocument/2006/relationships" xmlns:p="http://schemas.openxmlformats.org/presentationml/2006/main">
+  <p:cSld>
+    <p:spTree>
+      <p:nvGrpSpPr>
+        <p:cNvPr id="1" name=""/>
+        <p:cNvGrpSpPr/>
+        <p:nvPr/>
+      </p:nvGrpSpPr>
+      <p:grpSpPr>
+        <a:xfrm>
+          <a:off x="0" y="0"/>
+          <a:ext cx="0" cy="0"/>
+          <a:chOff x="0" y="0"/>
+          <a:chExt cx="0" cy="0"/>
+        </a:xfrm>
+      </p:grpSpPr>
       <p:sp>
         <p:nvSpPr>
           <p:cNvPr id="2" name="Title 1"/>
@@ -7344,7 +7406,7 @@
 </p:sld>
 </file>
 
-<file path=ppt/slides/slide23.xml><?xml version="1.0" encoding="utf-8"?>
+<file path=ppt/slides/slide24.xml><?xml version="1.0" encoding="utf-8"?>
 <p:sld xmlns:a="http://schemas.openxmlformats.org/drawingml/2006/main" xmlns:r="http://schemas.openxmlformats.org/officeDocument/2006/relationships" xmlns:p="http://schemas.openxmlformats.org/presentationml/2006/main">
   <p:cSld>
     <p:spTree>

</xml_diff>

<commit_message>
fixed state path issue,added title showing % when hover on county and grow the map
</commit_message>
<xml_diff>
--- a/Ing..Process Book - MileStone.pptx
+++ b/Ing..Process Book - MileStone.pptx
@@ -22,13 +22,15 @@
     <p:sldId id="271" r:id="rId16"/>
     <p:sldId id="272" r:id="rId17"/>
     <p:sldId id="274" r:id="rId18"/>
-    <p:sldId id="277" r:id="rId19"/>
-    <p:sldId id="278" r:id="rId20"/>
-    <p:sldId id="279" r:id="rId21"/>
-    <p:sldId id="283" r:id="rId22"/>
-    <p:sldId id="284" r:id="rId23"/>
-    <p:sldId id="280" r:id="rId24"/>
-    <p:sldId id="282" r:id="rId25"/>
+    <p:sldId id="285" r:id="rId19"/>
+    <p:sldId id="288" r:id="rId20"/>
+    <p:sldId id="278" r:id="rId21"/>
+    <p:sldId id="286" r:id="rId22"/>
+    <p:sldId id="277" r:id="rId23"/>
+    <p:sldId id="279" r:id="rId24"/>
+    <p:sldId id="283" r:id="rId25"/>
+    <p:sldId id="280" r:id="rId26"/>
+    <p:sldId id="282" r:id="rId27"/>
   </p:sldIdLst>
   <p:sldSz cx="12192000" cy="6858000"/>
   <p:notesSz cx="6858000" cy="9144000"/>
@@ -180,6 +182,7 @@
           </a:p>
         </c:rich>
       </c:tx>
+      <c:layout/>
       <c:overlay val="0"/>
       <c:spPr>
         <a:noFill/>
@@ -922,11 +925,11 @@
         </c:dLbls>
         <c:gapWidth val="219"/>
         <c:overlap val="-27"/>
-        <c:axId val="244634480"/>
-        <c:axId val="327502928"/>
+        <c:axId val="316367056"/>
+        <c:axId val="316372936"/>
       </c:barChart>
       <c:catAx>
-        <c:axId val="244634480"/>
+        <c:axId val="316367056"/>
         <c:scaling>
           <c:orientation val="minMax"/>
         </c:scaling>
@@ -969,7 +972,7 @@
             <a:endParaRPr lang="en-US"/>
           </a:p>
         </c:txPr>
-        <c:crossAx val="327502928"/>
+        <c:crossAx val="316372936"/>
         <c:crosses val="autoZero"/>
         <c:auto val="1"/>
         <c:lblAlgn val="ctr"/>
@@ -977,7 +980,7 @@
         <c:noMultiLvlLbl val="0"/>
       </c:catAx>
       <c:valAx>
-        <c:axId val="327502928"/>
+        <c:axId val="316372936"/>
         <c:scaling>
           <c:orientation val="minMax"/>
         </c:scaling>
@@ -1028,7 +1031,7 @@
             <a:endParaRPr lang="en-US"/>
           </a:p>
         </c:txPr>
-        <c:crossAx val="244634480"/>
+        <c:crossAx val="316367056"/>
         <c:crosses val="autoZero"/>
         <c:crossBetween val="between"/>
       </c:valAx>
@@ -1042,6 +1045,7 @@
     </c:plotArea>
     <c:legend>
       <c:legendPos val="b"/>
+      <c:layout/>
       <c:overlay val="0"/>
       <c:spPr>
         <a:noFill/>
@@ -1772,7 +1776,7 @@
           <a:p>
             <a:fld id="{8AF18C45-445E-4B54-B592-3813387BCB03}" type="datetimeFigureOut">
               <a:rPr lang="en-US" smtClean="0"/>
-              <a:t>4/25/2015</a:t>
+              <a:t>4/26/2015</a:t>
             </a:fld>
             <a:endParaRPr lang="en-US"/>
           </a:p>
@@ -1942,7 +1946,7 @@
           <a:p>
             <a:fld id="{8AF18C45-445E-4B54-B592-3813387BCB03}" type="datetimeFigureOut">
               <a:rPr lang="en-US" smtClean="0"/>
-              <a:t>4/25/2015</a:t>
+              <a:t>4/26/2015</a:t>
             </a:fld>
             <a:endParaRPr lang="en-US"/>
           </a:p>
@@ -2122,7 +2126,7 @@
           <a:p>
             <a:fld id="{8AF18C45-445E-4B54-B592-3813387BCB03}" type="datetimeFigureOut">
               <a:rPr lang="en-US" smtClean="0"/>
-              <a:t>4/25/2015</a:t>
+              <a:t>4/26/2015</a:t>
             </a:fld>
             <a:endParaRPr lang="en-US"/>
           </a:p>
@@ -2292,7 +2296,7 @@
           <a:p>
             <a:fld id="{8AF18C45-445E-4B54-B592-3813387BCB03}" type="datetimeFigureOut">
               <a:rPr lang="en-US" smtClean="0"/>
-              <a:t>4/25/2015</a:t>
+              <a:t>4/26/2015</a:t>
             </a:fld>
             <a:endParaRPr lang="en-US"/>
           </a:p>
@@ -2538,7 +2542,7 @@
           <a:p>
             <a:fld id="{8AF18C45-445E-4B54-B592-3813387BCB03}" type="datetimeFigureOut">
               <a:rPr lang="en-US" smtClean="0"/>
-              <a:t>4/25/2015</a:t>
+              <a:t>4/26/2015</a:t>
             </a:fld>
             <a:endParaRPr lang="en-US"/>
           </a:p>
@@ -2770,7 +2774,7 @@
           <a:p>
             <a:fld id="{8AF18C45-445E-4B54-B592-3813387BCB03}" type="datetimeFigureOut">
               <a:rPr lang="en-US" smtClean="0"/>
-              <a:t>4/25/2015</a:t>
+              <a:t>4/26/2015</a:t>
             </a:fld>
             <a:endParaRPr lang="en-US"/>
           </a:p>
@@ -3137,7 +3141,7 @@
           <a:p>
             <a:fld id="{8AF18C45-445E-4B54-B592-3813387BCB03}" type="datetimeFigureOut">
               <a:rPr lang="en-US" smtClean="0"/>
-              <a:t>4/25/2015</a:t>
+              <a:t>4/26/2015</a:t>
             </a:fld>
             <a:endParaRPr lang="en-US"/>
           </a:p>
@@ -3255,7 +3259,7 @@
           <a:p>
             <a:fld id="{8AF18C45-445E-4B54-B592-3813387BCB03}" type="datetimeFigureOut">
               <a:rPr lang="en-US" smtClean="0"/>
-              <a:t>4/25/2015</a:t>
+              <a:t>4/26/2015</a:t>
             </a:fld>
             <a:endParaRPr lang="en-US"/>
           </a:p>
@@ -3350,7 +3354,7 @@
           <a:p>
             <a:fld id="{8AF18C45-445E-4B54-B592-3813387BCB03}" type="datetimeFigureOut">
               <a:rPr lang="en-US" smtClean="0"/>
-              <a:t>4/25/2015</a:t>
+              <a:t>4/26/2015</a:t>
             </a:fld>
             <a:endParaRPr lang="en-US"/>
           </a:p>
@@ -3627,7 +3631,7 @@
           <a:p>
             <a:fld id="{8AF18C45-445E-4B54-B592-3813387BCB03}" type="datetimeFigureOut">
               <a:rPr lang="en-US" smtClean="0"/>
-              <a:t>4/25/2015</a:t>
+              <a:t>4/26/2015</a:t>
             </a:fld>
             <a:endParaRPr lang="en-US"/>
           </a:p>
@@ -3880,7 +3884,7 @@
           <a:p>
             <a:fld id="{8AF18C45-445E-4B54-B592-3813387BCB03}" type="datetimeFigureOut">
               <a:rPr lang="en-US" smtClean="0"/>
-              <a:t>4/25/2015</a:t>
+              <a:t>4/26/2015</a:t>
             </a:fld>
             <a:endParaRPr lang="en-US"/>
           </a:p>
@@ -4093,7 +4097,7 @@
           <a:p>
             <a:fld id="{8AF18C45-445E-4B54-B592-3813387BCB03}" type="datetimeFigureOut">
               <a:rPr lang="en-US" smtClean="0"/>
-              <a:t>4/25/2015</a:t>
+              <a:t>4/26/2015</a:t>
             </a:fld>
             <a:endParaRPr lang="en-US"/>
           </a:p>
@@ -5964,7 +5968,7 @@
         </p:spPr>
         <p:txBody>
           <a:bodyPr>
-            <a:normAutofit/>
+            <a:normAutofit fontScale="90000"/>
           </a:bodyPr>
           <a:lstStyle/>
           <a:p>
@@ -5972,7 +5976,13 @@
               <a:rPr lang="en-US" sz="3600" dirty="0" smtClean="0">
                 <a:latin typeface="Rockwell" panose="02060603020205020403" pitchFamily="18" charset="0"/>
               </a:rPr>
-              <a:t>7.  Design and Implementation To Do</a:t>
+              <a:t>7.  Design and Implementation To </a:t>
+            </a:r>
+            <a:r>
+              <a:rPr lang="en-US" sz="3600" dirty="0" smtClean="0">
+                <a:latin typeface="Rockwell" panose="02060603020205020403" pitchFamily="18" charset="0"/>
+              </a:rPr>
+              <a:t>Do – 04/10/2015</a:t>
             </a:r>
             <a:endParaRPr lang="en-US" sz="3600" dirty="0">
               <a:latin typeface="Rockwell" panose="02060603020205020403" pitchFamily="18" charset="0"/>
@@ -5998,7 +6008,7 @@
         </p:spPr>
         <p:txBody>
           <a:bodyPr>
-            <a:normAutofit fontScale="92500" lnSpcReduction="10000"/>
+            <a:normAutofit lnSpcReduction="10000"/>
           </a:bodyPr>
           <a:lstStyle/>
           <a:p>
@@ -6048,37 +6058,11 @@
           <a:p>
             <a:r>
               <a:rPr lang="en-US" sz="2000" dirty="0" smtClean="0"/>
-              <a:t> Fix the venture </a:t>
-            </a:r>
-            <a:r>
-              <a:rPr lang="en-US" sz="2000" dirty="0" err="1" smtClean="0"/>
-              <a:t>captial</a:t>
+              <a:t>Add </a:t>
             </a:r>
             <a:r>
               <a:rPr lang="en-US" sz="2000" dirty="0" smtClean="0"/>
-              <a:t> </a:t>
-            </a:r>
-            <a:r>
-              <a:rPr lang="en-US" sz="2000" dirty="0" err="1" smtClean="0"/>
-              <a:t>Choropleth</a:t>
-            </a:r>
-            <a:r>
-              <a:rPr lang="en-US" sz="2000" dirty="0" smtClean="0"/>
-              <a:t> map CA,NY data showing </a:t>
-            </a:r>
-            <a:r>
-              <a:rPr lang="en-US" sz="2000" dirty="0" err="1" smtClean="0"/>
-              <a:t>NaN</a:t>
-            </a:r>
-            <a:r>
-              <a:rPr lang="en-US" sz="2000" dirty="0" smtClean="0"/>
-              <a:t> error</a:t>
-            </a:r>
-          </a:p>
-          <a:p>
-            <a:r>
-              <a:rPr lang="en-US" sz="2000" dirty="0" smtClean="0"/>
-              <a:t> Add interactive features to allow users to select</a:t>
+              <a:t>interactive features to allow users to select</a:t>
             </a:r>
           </a:p>
           <a:p>
@@ -6174,135 +6158,55 @@
         <p:spPr>
           <a:xfrm>
             <a:off x="838200" y="0"/>
-            <a:ext cx="10515600" cy="865159"/>
+            <a:ext cx="10515600" cy="510140"/>
           </a:xfrm>
         </p:spPr>
         <p:txBody>
           <a:bodyPr>
-            <a:normAutofit/>
+            <a:noAutofit/>
           </a:bodyPr>
           <a:lstStyle/>
           <a:p>
             <a:r>
-              <a:rPr lang="en-US" sz="3600" dirty="0">
+              <a:rPr lang="en-US" sz="3200" dirty="0" smtClean="0">
                 <a:latin typeface="Rockwell" panose="02060603020205020403" pitchFamily="18" charset="0"/>
               </a:rPr>
-              <a:t>8</a:t>
-            </a:r>
-            <a:r>
-              <a:rPr lang="en-US" sz="3600" dirty="0" smtClean="0">
-                <a:latin typeface="Rockwell" panose="02060603020205020403" pitchFamily="18" charset="0"/>
-              </a:rPr>
-              <a:t>.  Design Evolution Ideas 04/23/2015</a:t>
-            </a:r>
-            <a:endParaRPr lang="en-US" sz="3600" dirty="0">
+              <a:t>Latest Finished design – 04/26/2015</a:t>
+            </a:r>
+            <a:endParaRPr lang="en-US" sz="3200" dirty="0">
               <a:latin typeface="Rockwell" panose="02060603020205020403" pitchFamily="18" charset="0"/>
             </a:endParaRPr>
           </a:p>
         </p:txBody>
       </p:sp>
-      <p:sp>
-        <p:nvSpPr>
-          <p:cNvPr id="3" name="Content Placeholder 2"/>
-          <p:cNvSpPr>
-            <a:spLocks noGrp="1"/>
-          </p:cNvSpPr>
-          <p:nvPr>
-            <p:ph idx="1"/>
-          </p:nvPr>
-        </p:nvSpPr>
-        <p:spPr>
-          <a:xfrm>
-            <a:off x="838200" y="1022147"/>
-            <a:ext cx="10515600" cy="4880179"/>
-          </a:xfrm>
-        </p:spPr>
-        <p:txBody>
-          <a:bodyPr>
-            <a:normAutofit/>
-          </a:bodyPr>
-          <a:lstStyle/>
-          <a:p>
-            <a:pPr marL="0" indent="0">
-              <a:buNone/>
-            </a:pPr>
-            <a:r>
-              <a:rPr lang="en-US" sz="2000" dirty="0" smtClean="0"/>
-              <a:t>Three directions of improvement</a:t>
-            </a:r>
-          </a:p>
-          <a:p>
-            <a:r>
-              <a:rPr lang="en-US" sz="2000" dirty="0" smtClean="0"/>
-              <a:t>Depth : more resolution, showing the race(white) in county level</a:t>
-            </a:r>
-          </a:p>
-          <a:p>
-            <a:r>
-              <a:rPr lang="en-US" sz="2000" dirty="0" smtClean="0"/>
-              <a:t>Variety: drop down menu that user can see race( black, Hispanic, other) in county level</a:t>
-            </a:r>
-            <a:r>
-              <a:rPr lang="en-US" sz="2400" dirty="0" smtClean="0"/>
-              <a:t>;</a:t>
-            </a:r>
-          </a:p>
-          <a:p>
-            <a:pPr marL="0" indent="0">
-              <a:buNone/>
-            </a:pPr>
-            <a:r>
-              <a:rPr lang="en-US" sz="2400" dirty="0"/>
-              <a:t> </a:t>
-            </a:r>
-            <a:r>
-              <a:rPr lang="en-US" sz="2400" dirty="0" smtClean="0"/>
-              <a:t>             : year slide bar—animation</a:t>
-            </a:r>
-          </a:p>
-          <a:p>
-            <a:r>
-              <a:rPr lang="en-US" sz="2400" dirty="0" smtClean="0"/>
-              <a:t>Brush function, </a:t>
-            </a:r>
-          </a:p>
-          <a:p>
-            <a:r>
-              <a:rPr lang="en-US" sz="2400" dirty="0" err="1" smtClean="0"/>
-              <a:t>Treemap</a:t>
-            </a:r>
-            <a:r>
-              <a:rPr lang="en-US" sz="2400" dirty="0" smtClean="0"/>
-              <a:t> will get updated in different years as well : </a:t>
-            </a:r>
-            <a:r>
-              <a:rPr lang="en-US" sz="2400" dirty="0" err="1" smtClean="0"/>
-              <a:t>treemap</a:t>
-            </a:r>
-            <a:r>
-              <a:rPr lang="en-US" sz="2400" dirty="0" smtClean="0"/>
-              <a:t> takes care of total pop, race</a:t>
-            </a:r>
-          </a:p>
-          <a:p>
-            <a:r>
-              <a:rPr lang="en-US" sz="2400" dirty="0" smtClean="0"/>
-              <a:t>Pop map takes care of race</a:t>
-            </a:r>
-          </a:p>
-          <a:p>
-            <a:r>
-              <a:rPr lang="en-US" sz="2400" dirty="0" smtClean="0"/>
-              <a:t>Sex gender is shown already</a:t>
-            </a:r>
-            <a:endParaRPr lang="en-US" sz="2000" dirty="0" smtClean="0"/>
-          </a:p>
-        </p:txBody>
-      </p:sp>
+      <p:pic>
+        <p:nvPicPr>
+          <p:cNvPr id="4" name="Picture 3"/>
+          <p:cNvPicPr>
+            <a:picLocks noChangeAspect="1"/>
+          </p:cNvPicPr>
+          <p:nvPr/>
+        </p:nvPicPr>
+        <p:blipFill>
+          <a:blip r:embed="rId2"/>
+          <a:stretch>
+            <a:fillRect/>
+          </a:stretch>
+        </p:blipFill>
+        <p:spPr>
+          <a:xfrm>
+            <a:off x="838200" y="625643"/>
+            <a:ext cx="10753725" cy="6396289"/>
+          </a:xfrm>
+          <a:prstGeom prst="rect">
+            <a:avLst/>
+          </a:prstGeom>
+        </p:spPr>
+      </p:pic>
     </p:spTree>
     <p:extLst>
       <p:ext uri="{BB962C8B-B14F-4D97-AF65-F5344CB8AC3E}">
-        <p14:creationId xmlns:p14="http://schemas.microsoft.com/office/powerpoint/2010/main" val="3523346248"/>
+        <p14:creationId xmlns:p14="http://schemas.microsoft.com/office/powerpoint/2010/main" val="235953142"/>
       </p:ext>
     </p:extLst>
   </p:cSld>
@@ -6336,340 +6240,247 @@
           <a:chExt cx="0" cy="0"/>
         </a:xfrm>
       </p:grpSpPr>
-      <p:pic>
-        <p:nvPicPr>
-          <p:cNvPr id="4" name="Content Placeholder 3"/>
-          <p:cNvPicPr>
-            <a:picLocks noGrp="1" noChangeAspect="1"/>
-          </p:cNvPicPr>
+      <p:sp>
+        <p:nvSpPr>
+          <p:cNvPr id="2" name="Title 1"/>
+          <p:cNvSpPr>
+            <a:spLocks noGrp="1"/>
+          </p:cNvSpPr>
+          <p:nvPr>
+            <p:ph type="title"/>
+          </p:nvPr>
+        </p:nvSpPr>
+        <p:spPr>
+          <a:xfrm>
+            <a:off x="838200" y="0"/>
+            <a:ext cx="10515600" cy="865159"/>
+          </a:xfrm>
+        </p:spPr>
+        <p:txBody>
+          <a:bodyPr>
+            <a:normAutofit/>
+          </a:bodyPr>
+          <a:lstStyle/>
+          <a:p>
+            <a:r>
+              <a:rPr lang="en-US" sz="3600" dirty="0" smtClean="0">
+                <a:latin typeface="Rockwell" panose="02060603020205020403" pitchFamily="18" charset="0"/>
+              </a:rPr>
+              <a:t>Design </a:t>
+            </a:r>
+            <a:r>
+              <a:rPr lang="en-US" sz="3600" dirty="0" smtClean="0">
+                <a:latin typeface="Rockwell" panose="02060603020205020403" pitchFamily="18" charset="0"/>
+              </a:rPr>
+              <a:t>and Implementation To </a:t>
+            </a:r>
+            <a:r>
+              <a:rPr lang="en-US" sz="3600" dirty="0" smtClean="0">
+                <a:latin typeface="Rockwell" panose="02060603020205020403" pitchFamily="18" charset="0"/>
+              </a:rPr>
+              <a:t>Do – 04/26/2015</a:t>
+            </a:r>
+            <a:endParaRPr lang="en-US" sz="3600" dirty="0">
+              <a:latin typeface="Rockwell" panose="02060603020205020403" pitchFamily="18" charset="0"/>
+            </a:endParaRPr>
+          </a:p>
+        </p:txBody>
+      </p:sp>
+      <p:sp>
+        <p:nvSpPr>
+          <p:cNvPr id="3" name="Content Placeholder 2"/>
+          <p:cNvSpPr>
+            <a:spLocks noGrp="1"/>
+          </p:cNvSpPr>
           <p:nvPr>
             <p:ph idx="1"/>
           </p:nvPr>
-        </p:nvPicPr>
-        <p:blipFill>
-          <a:blip r:embed="rId2"/>
-          <a:stretch>
-            <a:fillRect/>
-          </a:stretch>
-        </p:blipFill>
-        <p:spPr>
-          <a:xfrm>
-            <a:off x="309784" y="173255"/>
-            <a:ext cx="5561627" cy="3514322"/>
-          </a:xfrm>
-          <a:prstGeom prst="rect">
-            <a:avLst/>
-          </a:prstGeom>
-        </p:spPr>
-      </p:pic>
-      <p:pic>
-        <p:nvPicPr>
-          <p:cNvPr id="5" name="Picture 4"/>
-          <p:cNvPicPr>
-            <a:picLocks noChangeAspect="1"/>
-          </p:cNvPicPr>
-          <p:nvPr/>
-        </p:nvPicPr>
-        <p:blipFill>
-          <a:blip r:embed="rId3"/>
-          <a:stretch>
-            <a:fillRect/>
-          </a:stretch>
-        </p:blipFill>
-        <p:spPr>
-          <a:xfrm>
-            <a:off x="8911505" y="3687577"/>
-            <a:ext cx="2271362" cy="3169306"/>
-          </a:xfrm>
-          <a:prstGeom prst="rect">
-            <a:avLst/>
-          </a:prstGeom>
-        </p:spPr>
-      </p:pic>
-      <p:pic>
-        <p:nvPicPr>
-          <p:cNvPr id="6" name="Picture 5"/>
-          <p:cNvPicPr>
-            <a:picLocks noChangeAspect="1"/>
-          </p:cNvPicPr>
-          <p:nvPr/>
-        </p:nvPicPr>
-        <p:blipFill>
-          <a:blip r:embed="rId4"/>
-          <a:stretch>
-            <a:fillRect/>
-          </a:stretch>
-        </p:blipFill>
-        <p:spPr>
-          <a:xfrm>
-            <a:off x="5871411" y="138734"/>
-            <a:ext cx="5176617" cy="3416968"/>
-          </a:xfrm>
-          <a:prstGeom prst="rect">
-            <a:avLst/>
-          </a:prstGeom>
-        </p:spPr>
-      </p:pic>
-      <p:sp>
-        <p:nvSpPr>
-          <p:cNvPr id="7" name="TextBox 6"/>
-          <p:cNvSpPr txBox="1"/>
-          <p:nvPr/>
-        </p:nvSpPr>
-        <p:spPr>
-          <a:xfrm>
-            <a:off x="4379495" y="413886"/>
-            <a:ext cx="683393" cy="369332"/>
-          </a:xfrm>
-          <a:prstGeom prst="rect">
-            <a:avLst/>
-          </a:prstGeom>
-          <a:noFill/>
-        </p:spPr>
-        <p:txBody>
-          <a:bodyPr wrap="square" rtlCol="0">
-            <a:spAutoFit/>
+        </p:nvSpPr>
+        <p:spPr>
+          <a:xfrm>
+            <a:off x="838200" y="1022147"/>
+            <a:ext cx="10515600" cy="4880179"/>
+          </a:xfrm>
+        </p:spPr>
+        <p:txBody>
+          <a:bodyPr>
+            <a:normAutofit/>
           </a:bodyPr>
           <a:lstStyle/>
           <a:p>
             <a:r>
-              <a:rPr lang="en-US" dirty="0" smtClean="0">
+              <a:rPr lang="en-US" sz="2000" dirty="0"/>
+              <a:t> </a:t>
+            </a:r>
+            <a:r>
+              <a:rPr lang="en-US" sz="2000" dirty="0" smtClean="0"/>
+              <a:t>To </a:t>
+            </a:r>
+            <a:r>
+              <a:rPr lang="en-US" sz="2000" dirty="0"/>
+              <a:t>link </a:t>
+            </a:r>
+            <a:r>
+              <a:rPr lang="en-US" sz="2000" dirty="0" err="1"/>
+              <a:t>choropleth</a:t>
+            </a:r>
+            <a:r>
+              <a:rPr lang="en-US" sz="2000" dirty="0"/>
+              <a:t>, </a:t>
+            </a:r>
+            <a:r>
+              <a:rPr lang="en-US" sz="2000" dirty="0" err="1"/>
+              <a:t>treemap</a:t>
+            </a:r>
+            <a:r>
+              <a:rPr lang="en-US" sz="2000" dirty="0"/>
+              <a:t>, pyramid that these 3 vis will be updated synchronously. </a:t>
+            </a:r>
+            <a:endParaRPr lang="en-US" sz="2000" dirty="0" smtClean="0"/>
+          </a:p>
+          <a:p>
+            <a:r>
+              <a:rPr lang="en-US" sz="2000" dirty="0"/>
+              <a:t> </a:t>
+            </a:r>
+            <a:r>
+              <a:rPr lang="en-US" sz="2000" dirty="0" smtClean="0"/>
+              <a:t>Create an auto play function to show the changes throughout the years</a:t>
+            </a:r>
+            <a:endParaRPr lang="en-US" sz="2000" dirty="0"/>
+          </a:p>
+          <a:p>
+            <a:r>
+              <a:rPr lang="en-US" sz="2000" dirty="0" smtClean="0"/>
+              <a:t> </a:t>
+            </a:r>
+            <a:r>
+              <a:rPr lang="en-US" sz="2000" dirty="0"/>
+              <a:t>If time allows, create a stacked bar by age group to show ethnic group distributions horizontally, and add a brush window function to it to allow it  update other vis.</a:t>
+            </a:r>
+          </a:p>
+          <a:p>
+            <a:r>
+              <a:rPr lang="en-US" sz="2000" dirty="0" smtClean="0"/>
+              <a:t>To </a:t>
+            </a:r>
+            <a:r>
+              <a:rPr lang="en-US" sz="2000" dirty="0"/>
+              <a:t>add more CSS elements to make interactivity menu look more professional, reorganize visualizations layout and size </a:t>
+            </a:r>
+            <a:r>
+              <a:rPr lang="en-US" sz="2000" dirty="0" smtClean="0"/>
+              <a:t>to make the vis </a:t>
+            </a:r>
+            <a:r>
+              <a:rPr lang="en-US" sz="2000" dirty="0"/>
+              <a:t>fit in one page without scrolling down</a:t>
+            </a:r>
+            <a:r>
+              <a:rPr lang="en-US" sz="2000" dirty="0" smtClean="0"/>
+              <a:t>.</a:t>
+            </a:r>
+          </a:p>
+          <a:p>
+            <a:r>
+              <a:rPr lang="en-US" sz="2000" dirty="0" smtClean="0"/>
+              <a:t>Add loading and status bar, add observation </a:t>
+            </a:r>
+            <a:endParaRPr lang="en-US" sz="2000" dirty="0"/>
+          </a:p>
+          <a:p>
+            <a:r>
+              <a:rPr lang="en-US" sz="2000" dirty="0" smtClean="0"/>
+              <a:t>Once </a:t>
+            </a:r>
+            <a:r>
+              <a:rPr lang="en-US" sz="2000" dirty="0"/>
+              <a:t>the above all done, finish process book and make a screen </a:t>
+            </a:r>
+            <a:r>
+              <a:rPr lang="en-US" sz="2000" dirty="0" smtClean="0"/>
+              <a:t>cast</a:t>
+            </a:r>
+          </a:p>
+          <a:p>
+            <a:pPr marL="0" indent="0">
+              <a:buNone/>
+            </a:pPr>
+            <a:r>
+              <a:rPr lang="en-US" sz="2000" dirty="0" smtClean="0"/>
+              <a:t>TF ideas </a:t>
+            </a:r>
+          </a:p>
+          <a:p>
+            <a:pPr marL="0" indent="0">
+              <a:buNone/>
+            </a:pPr>
+            <a:r>
+              <a:rPr lang="en-US" sz="2000" dirty="0" smtClean="0">
                 <a:solidFill>
                   <a:srgbClr val="FF0000"/>
                 </a:solidFill>
               </a:rPr>
-              <a:t>Race</a:t>
-            </a:r>
-            <a:endParaRPr lang="en-US" dirty="0">
-              <a:solidFill>
-                <a:srgbClr val="FF0000"/>
-              </a:solidFill>
-            </a:endParaRPr>
-          </a:p>
-        </p:txBody>
-      </p:sp>
-      <p:sp>
-        <p:nvSpPr>
-          <p:cNvPr id="8" name="TextBox 7"/>
-          <p:cNvSpPr txBox="1"/>
-          <p:nvPr/>
-        </p:nvSpPr>
-        <p:spPr>
-          <a:xfrm>
-            <a:off x="6756935" y="275386"/>
-            <a:ext cx="1213349" cy="646331"/>
-          </a:xfrm>
-          <a:prstGeom prst="rect">
-            <a:avLst/>
-          </a:prstGeom>
-          <a:noFill/>
-        </p:spPr>
-        <p:txBody>
-          <a:bodyPr wrap="square" rtlCol="0">
-            <a:spAutoFit/>
-          </a:bodyPr>
-          <a:lstStyle/>
-          <a:p>
-            <a:r>
-              <a:rPr lang="en-US" dirty="0" smtClean="0">
+              <a:t>-- Click </a:t>
+            </a:r>
+            <a:r>
+              <a:rPr lang="en-US" sz="2000" dirty="0" err="1" smtClean="0">
                 <a:solidFill>
                   <a:srgbClr val="FF0000"/>
                 </a:solidFill>
               </a:rPr>
-              <a:t>Total Pop&amp; All Race</a:t>
-            </a:r>
-            <a:endParaRPr lang="en-US" dirty="0">
-              <a:solidFill>
-                <a:srgbClr val="FF0000"/>
-              </a:solidFill>
-            </a:endParaRPr>
-          </a:p>
-        </p:txBody>
-      </p:sp>
-      <p:sp>
-        <p:nvSpPr>
-          <p:cNvPr id="9" name="TextBox 8"/>
-          <p:cNvSpPr txBox="1"/>
-          <p:nvPr/>
-        </p:nvSpPr>
-        <p:spPr>
-          <a:xfrm>
-            <a:off x="10499474" y="3888608"/>
-            <a:ext cx="1368475" cy="369332"/>
-          </a:xfrm>
-          <a:prstGeom prst="rect">
-            <a:avLst/>
-          </a:prstGeom>
-          <a:noFill/>
-        </p:spPr>
-        <p:txBody>
-          <a:bodyPr wrap="square" rtlCol="0">
-            <a:spAutoFit/>
-          </a:bodyPr>
-          <a:lstStyle/>
-          <a:p>
-            <a:r>
-              <a:rPr lang="en-US" dirty="0" smtClean="0">
+              <a:t>treemap</a:t>
+            </a:r>
+            <a:r>
+              <a:rPr lang="en-US" sz="2000" dirty="0" smtClean="0">
                 <a:solidFill>
                   <a:srgbClr val="FF0000"/>
                 </a:solidFill>
               </a:rPr>
-              <a:t>Sex by state</a:t>
-            </a:r>
-            <a:endParaRPr lang="en-US" dirty="0">
-              <a:solidFill>
-                <a:srgbClr val="FF0000"/>
-              </a:solidFill>
-            </a:endParaRPr>
-          </a:p>
-        </p:txBody>
-      </p:sp>
-      <p:pic>
-        <p:nvPicPr>
-          <p:cNvPr id="10" name="Picture 9"/>
-          <p:cNvPicPr>
-            <a:picLocks noChangeAspect="1"/>
-          </p:cNvPicPr>
-          <p:nvPr/>
-        </p:nvPicPr>
-        <p:blipFill>
-          <a:blip r:embed="rId5"/>
-          <a:stretch>
-            <a:fillRect/>
-          </a:stretch>
-        </p:blipFill>
-        <p:spPr>
-          <a:xfrm>
-            <a:off x="342356" y="4929808"/>
-            <a:ext cx="8569149" cy="1594169"/>
-          </a:xfrm>
-          <a:prstGeom prst="rect">
-            <a:avLst/>
-          </a:prstGeom>
-        </p:spPr>
-      </p:pic>
-      <p:sp>
-        <p:nvSpPr>
-          <p:cNvPr id="11" name="TextBox 10"/>
-          <p:cNvSpPr txBox="1"/>
-          <p:nvPr/>
-        </p:nvSpPr>
-        <p:spPr>
-          <a:xfrm>
-            <a:off x="1134744" y="5163416"/>
-            <a:ext cx="1464077" cy="369332"/>
-          </a:xfrm>
-          <a:prstGeom prst="rect">
-            <a:avLst/>
-          </a:prstGeom>
-          <a:noFill/>
-        </p:spPr>
-        <p:txBody>
-          <a:bodyPr wrap="square" rtlCol="0">
-            <a:spAutoFit/>
-          </a:bodyPr>
-          <a:lstStyle/>
-          <a:p>
-            <a:r>
-              <a:rPr lang="en-US" dirty="0" err="1" smtClean="0">
+              <a:t> California, the California state will stand out in </a:t>
+            </a:r>
+            <a:r>
+              <a:rPr lang="en-US" sz="2000" dirty="0" err="1" smtClean="0">
                 <a:solidFill>
                   <a:srgbClr val="FF0000"/>
                 </a:solidFill>
               </a:rPr>
-              <a:t>Age&amp;Race</a:t>
-            </a:r>
-            <a:endParaRPr lang="en-US" dirty="0">
-              <a:solidFill>
-                <a:srgbClr val="FF0000"/>
-              </a:solidFill>
-            </a:endParaRPr>
-          </a:p>
-        </p:txBody>
-      </p:sp>
-      <p:sp>
-        <p:nvSpPr>
-          <p:cNvPr id="12" name="TextBox 11"/>
-          <p:cNvSpPr txBox="1"/>
-          <p:nvPr/>
-        </p:nvSpPr>
-        <p:spPr>
-          <a:xfrm>
-            <a:off x="3573531" y="6044099"/>
-            <a:ext cx="683393" cy="369332"/>
-          </a:xfrm>
-          <a:prstGeom prst="rect">
-            <a:avLst/>
-          </a:prstGeom>
-          <a:noFill/>
-        </p:spPr>
-        <p:txBody>
-          <a:bodyPr wrap="square" rtlCol="0">
-            <a:spAutoFit/>
-          </a:bodyPr>
-          <a:lstStyle/>
-          <a:p>
-            <a:r>
-              <a:rPr lang="en-US" dirty="0" smtClean="0">
+              <a:t>choropleth</a:t>
+            </a:r>
+            <a:r>
+              <a:rPr lang="en-US" sz="2000" dirty="0" smtClean="0">
                 <a:solidFill>
                   <a:srgbClr val="FF0000"/>
                 </a:solidFill>
               </a:rPr>
-              <a:t>Year</a:t>
-            </a:r>
-            <a:endParaRPr lang="en-US" dirty="0">
-              <a:solidFill>
-                <a:srgbClr val="FF0000"/>
-              </a:solidFill>
-            </a:endParaRPr>
-          </a:p>
-        </p:txBody>
-      </p:sp>
-      <p:sp>
-        <p:nvSpPr>
-          <p:cNvPr id="13" name="TextBox 12"/>
-          <p:cNvSpPr txBox="1"/>
-          <p:nvPr/>
-        </p:nvSpPr>
-        <p:spPr>
-          <a:xfrm>
-            <a:off x="1299411" y="3994484"/>
-            <a:ext cx="6814686" cy="923330"/>
-          </a:xfrm>
-          <a:prstGeom prst="rect">
-            <a:avLst/>
-          </a:prstGeom>
-          <a:noFill/>
-        </p:spPr>
-        <p:txBody>
-          <a:bodyPr wrap="square" rtlCol="0">
-            <a:spAutoFit/>
-          </a:bodyPr>
-          <a:lstStyle/>
-          <a:p>
-            <a:r>
-              <a:rPr lang="en-US" dirty="0" smtClean="0"/>
-              <a:t>Brush window in age group, will change other views;</a:t>
-            </a:r>
-          </a:p>
-          <a:p>
-            <a:r>
-              <a:rPr lang="en-US" dirty="0" smtClean="0"/>
-              <a:t>Play button can animate changes in years, 6 years data</a:t>
-            </a:r>
-          </a:p>
-          <a:p>
-            <a:r>
-              <a:rPr lang="en-US" dirty="0" smtClean="0"/>
-              <a:t>First need to make year change of race map with selection button</a:t>
-            </a:r>
-            <a:endParaRPr lang="en-US" dirty="0"/>
+              <a:t> map</a:t>
+            </a:r>
+          </a:p>
+          <a:p>
+            <a:pPr marL="0" indent="0">
+              <a:buNone/>
+            </a:pPr>
+            <a:r>
+              <a:rPr lang="en-US" sz="2000" dirty="0" smtClean="0">
+                <a:solidFill>
+                  <a:srgbClr val="FF0000"/>
+                </a:solidFill>
+              </a:rPr>
+              <a:t>-- Have a minority group map, radio button , show the largest minority group, second largest minority group, etc…</a:t>
+            </a:r>
+          </a:p>
+          <a:p>
+            <a:pPr marL="0" indent="0">
+              <a:buNone/>
+            </a:pPr>
+            <a:endParaRPr lang="en-US" sz="2000" dirty="0"/>
           </a:p>
         </p:txBody>
       </p:sp>
     </p:spTree>
     <p:extLst>
       <p:ext uri="{BB962C8B-B14F-4D97-AF65-F5344CB8AC3E}">
-        <p14:creationId xmlns:p14="http://schemas.microsoft.com/office/powerpoint/2010/main" val="3906189914"/>
+        <p14:creationId xmlns:p14="http://schemas.microsoft.com/office/powerpoint/2010/main" val="1189999129"/>
       </p:ext>
     </p:extLst>
   </p:cSld>
@@ -6865,115 +6676,59 @@
           <a:chExt cx="0" cy="0"/>
         </a:xfrm>
       </p:grpSpPr>
-      <p:sp>
-        <p:nvSpPr>
-          <p:cNvPr id="2" name="Title 1"/>
-          <p:cNvSpPr>
-            <a:spLocks noGrp="1"/>
-          </p:cNvSpPr>
-          <p:nvPr>
-            <p:ph type="title"/>
-          </p:nvPr>
-        </p:nvSpPr>
-        <p:spPr/>
-        <p:txBody>
-          <a:bodyPr>
-            <a:noAutofit/>
-          </a:bodyPr>
-          <a:lstStyle/>
-          <a:p>
-            <a:r>
-              <a:rPr lang="en-US" sz="2800" dirty="0"/>
-              <a:t>New data source– completed version</a:t>
-            </a:r>
-            <a:br>
-              <a:rPr lang="en-US" sz="2800" dirty="0"/>
-            </a:br>
-            <a:r>
-              <a:rPr lang="en-US" sz="2800" dirty="0"/>
-              <a:t>County Characteristics Datasets: Annual County Resident Population Estimates by Age, Sex, Race, and Hispanic Origin: </a:t>
-            </a:r>
-            <a:r>
-              <a:rPr lang="en-US" sz="2800" dirty="0" smtClean="0"/>
-              <a:t>April 2010 </a:t>
-            </a:r>
-            <a:r>
-              <a:rPr lang="en-US" sz="2800" dirty="0"/>
-              <a:t>to </a:t>
-            </a:r>
-            <a:r>
-              <a:rPr lang="en-US" sz="2800" dirty="0" smtClean="0"/>
-              <a:t>July 2013</a:t>
-            </a:r>
-            <a:endParaRPr lang="en-US" sz="2800" dirty="0"/>
-          </a:p>
-        </p:txBody>
-      </p:sp>
-      <p:sp>
-        <p:nvSpPr>
-          <p:cNvPr id="3" name="Content Placeholder 2"/>
-          <p:cNvSpPr>
-            <a:spLocks noGrp="1"/>
-          </p:cNvSpPr>
-          <p:nvPr>
-            <p:ph idx="1"/>
-          </p:nvPr>
-        </p:nvSpPr>
-        <p:spPr>
-          <a:xfrm>
-            <a:off x="838200" y="1690688"/>
-            <a:ext cx="10515600" cy="4486275"/>
-          </a:xfrm>
-        </p:spPr>
-        <p:txBody>
-          <a:bodyPr/>
-          <a:lstStyle/>
-          <a:p>
-            <a:r>
-              <a:rPr lang="en-US" sz="2000" dirty="0">
-                <a:hlinkClick r:id="rId2"/>
-              </a:rPr>
-              <a:t>http://</a:t>
-            </a:r>
-            <a:r>
-              <a:rPr lang="en-US" sz="2000" dirty="0" smtClean="0">
-                <a:hlinkClick r:id="rId2"/>
-              </a:rPr>
-              <a:t>www.census.gov/popest/data/counties/asrh/2013/CC-EST2013-ALLDATA.html</a:t>
-            </a:r>
-            <a:endParaRPr lang="en-US" sz="2000" dirty="0" smtClean="0"/>
-          </a:p>
-          <a:p>
-            <a:r>
-              <a:rPr lang="en-US" sz="2000" dirty="0"/>
-              <a:t>Optional data 2 </a:t>
-            </a:r>
-            <a:r>
-              <a:rPr lang="en-US" sz="2000" dirty="0">
-                <a:hlinkClick r:id="rId3"/>
-              </a:rPr>
-              <a:t>http://</a:t>
-            </a:r>
-            <a:r>
-              <a:rPr lang="en-US" sz="2000" dirty="0" smtClean="0">
-                <a:hlinkClick r:id="rId3"/>
-              </a:rPr>
-              <a:t>www.census.gov/did/www/saipe/data/statecounty/data/2008.html</a:t>
-            </a:r>
-            <a:endParaRPr lang="en-US" sz="2000" dirty="0" smtClean="0"/>
-          </a:p>
-          <a:p>
-            <a:r>
-              <a:rPr lang="en-US" sz="1800" dirty="0" smtClean="0"/>
-              <a:t>Data screen shot</a:t>
-            </a:r>
-            <a:endParaRPr lang="en-US" sz="1800" dirty="0"/>
-          </a:p>
-        </p:txBody>
-      </p:sp>
       <p:pic>
         <p:nvPicPr>
-          <p:cNvPr id="4" name="Picture 3"/>
+          <p:cNvPr id="4" name="Content Placeholder 3"/>
+          <p:cNvPicPr>
+            <a:picLocks noGrp="1" noChangeAspect="1"/>
+          </p:cNvPicPr>
+          <p:nvPr>
+            <p:ph idx="1"/>
+          </p:nvPr>
+        </p:nvPicPr>
+        <p:blipFill>
+          <a:blip r:embed="rId2"/>
+          <a:stretch>
+            <a:fillRect/>
+          </a:stretch>
+        </p:blipFill>
+        <p:spPr>
+          <a:xfrm>
+            <a:off x="309784" y="173255"/>
+            <a:ext cx="5561627" cy="3514322"/>
+          </a:xfrm>
+          <a:prstGeom prst="rect">
+            <a:avLst/>
+          </a:prstGeom>
+        </p:spPr>
+      </p:pic>
+      <p:pic>
+        <p:nvPicPr>
+          <p:cNvPr id="5" name="Picture 4"/>
+          <p:cNvPicPr>
+            <a:picLocks noChangeAspect="1"/>
+          </p:cNvPicPr>
+          <p:nvPr/>
+        </p:nvPicPr>
+        <p:blipFill>
+          <a:blip r:embed="rId3"/>
+          <a:stretch>
+            <a:fillRect/>
+          </a:stretch>
+        </p:blipFill>
+        <p:spPr>
+          <a:xfrm>
+            <a:off x="8911505" y="3687577"/>
+            <a:ext cx="2271362" cy="3169306"/>
+          </a:xfrm>
+          <a:prstGeom prst="rect">
+            <a:avLst/>
+          </a:prstGeom>
+        </p:spPr>
+      </p:pic>
+      <p:pic>
+        <p:nvPicPr>
+          <p:cNvPr id="6" name="Picture 5"/>
           <p:cNvPicPr>
             <a:picLocks noChangeAspect="1"/>
           </p:cNvPicPr>
@@ -6987,18 +6742,322 @@
         </p:blipFill>
         <p:spPr>
           <a:xfrm>
-            <a:off x="192505" y="2772076"/>
-            <a:ext cx="12146857" cy="3903044"/>
+            <a:off x="5871411" y="138734"/>
+            <a:ext cx="5176617" cy="3416968"/>
           </a:xfrm>
           <a:prstGeom prst="rect">
             <a:avLst/>
           </a:prstGeom>
         </p:spPr>
       </p:pic>
+      <p:sp>
+        <p:nvSpPr>
+          <p:cNvPr id="7" name="TextBox 6"/>
+          <p:cNvSpPr txBox="1"/>
+          <p:nvPr/>
+        </p:nvSpPr>
+        <p:spPr>
+          <a:xfrm>
+            <a:off x="4379495" y="413886"/>
+            <a:ext cx="683393" cy="369332"/>
+          </a:xfrm>
+          <a:prstGeom prst="rect">
+            <a:avLst/>
+          </a:prstGeom>
+          <a:noFill/>
+        </p:spPr>
+        <p:txBody>
+          <a:bodyPr wrap="square" rtlCol="0">
+            <a:spAutoFit/>
+          </a:bodyPr>
+          <a:lstStyle/>
+          <a:p>
+            <a:r>
+              <a:rPr lang="en-US" dirty="0" smtClean="0">
+                <a:solidFill>
+                  <a:srgbClr val="FF0000"/>
+                </a:solidFill>
+              </a:rPr>
+              <a:t>Race</a:t>
+            </a:r>
+            <a:endParaRPr lang="en-US" dirty="0">
+              <a:solidFill>
+                <a:srgbClr val="FF0000"/>
+              </a:solidFill>
+            </a:endParaRPr>
+          </a:p>
+        </p:txBody>
+      </p:sp>
+      <p:sp>
+        <p:nvSpPr>
+          <p:cNvPr id="8" name="TextBox 7"/>
+          <p:cNvSpPr txBox="1"/>
+          <p:nvPr/>
+        </p:nvSpPr>
+        <p:spPr>
+          <a:xfrm>
+            <a:off x="6756935" y="275386"/>
+            <a:ext cx="1213349" cy="646331"/>
+          </a:xfrm>
+          <a:prstGeom prst="rect">
+            <a:avLst/>
+          </a:prstGeom>
+          <a:noFill/>
+        </p:spPr>
+        <p:txBody>
+          <a:bodyPr wrap="square" rtlCol="0">
+            <a:spAutoFit/>
+          </a:bodyPr>
+          <a:lstStyle/>
+          <a:p>
+            <a:r>
+              <a:rPr lang="en-US" dirty="0" smtClean="0">
+                <a:solidFill>
+                  <a:srgbClr val="FF0000"/>
+                </a:solidFill>
+              </a:rPr>
+              <a:t>Total Pop&amp; All Race</a:t>
+            </a:r>
+            <a:endParaRPr lang="en-US" dirty="0">
+              <a:solidFill>
+                <a:srgbClr val="FF0000"/>
+              </a:solidFill>
+            </a:endParaRPr>
+          </a:p>
+        </p:txBody>
+      </p:sp>
+      <p:sp>
+        <p:nvSpPr>
+          <p:cNvPr id="9" name="TextBox 8"/>
+          <p:cNvSpPr txBox="1"/>
+          <p:nvPr/>
+        </p:nvSpPr>
+        <p:spPr>
+          <a:xfrm>
+            <a:off x="10499474" y="3888608"/>
+            <a:ext cx="1368475" cy="646331"/>
+          </a:xfrm>
+          <a:prstGeom prst="rect">
+            <a:avLst/>
+          </a:prstGeom>
+          <a:noFill/>
+        </p:spPr>
+        <p:txBody>
+          <a:bodyPr wrap="square" rtlCol="0">
+            <a:spAutoFit/>
+          </a:bodyPr>
+          <a:lstStyle/>
+          <a:p>
+            <a:r>
+              <a:rPr lang="en-US" dirty="0" smtClean="0">
+                <a:solidFill>
+                  <a:srgbClr val="FF0000"/>
+                </a:solidFill>
+              </a:rPr>
+              <a:t>Gender</a:t>
+            </a:r>
+            <a:r>
+              <a:rPr lang="en-US" dirty="0" smtClean="0">
+                <a:solidFill>
+                  <a:srgbClr val="FF0000"/>
+                </a:solidFill>
+              </a:rPr>
+              <a:t> </a:t>
+            </a:r>
+            <a:r>
+              <a:rPr lang="en-US" dirty="0" smtClean="0">
+                <a:solidFill>
+                  <a:srgbClr val="FF0000"/>
+                </a:solidFill>
+              </a:rPr>
+              <a:t>by state</a:t>
+            </a:r>
+            <a:endParaRPr lang="en-US" dirty="0">
+              <a:solidFill>
+                <a:srgbClr val="FF0000"/>
+              </a:solidFill>
+            </a:endParaRPr>
+          </a:p>
+        </p:txBody>
+      </p:sp>
+      <p:pic>
+        <p:nvPicPr>
+          <p:cNvPr id="10" name="Picture 9"/>
+          <p:cNvPicPr>
+            <a:picLocks noChangeAspect="1"/>
+          </p:cNvPicPr>
+          <p:nvPr/>
+        </p:nvPicPr>
+        <p:blipFill>
+          <a:blip r:embed="rId5"/>
+          <a:stretch>
+            <a:fillRect/>
+          </a:stretch>
+        </p:blipFill>
+        <p:spPr>
+          <a:xfrm>
+            <a:off x="342356" y="4929808"/>
+            <a:ext cx="8569149" cy="1594169"/>
+          </a:xfrm>
+          <a:prstGeom prst="rect">
+            <a:avLst/>
+          </a:prstGeom>
+        </p:spPr>
+      </p:pic>
+      <p:sp>
+        <p:nvSpPr>
+          <p:cNvPr id="11" name="TextBox 10"/>
+          <p:cNvSpPr txBox="1"/>
+          <p:nvPr/>
+        </p:nvSpPr>
+        <p:spPr>
+          <a:xfrm>
+            <a:off x="1134744" y="5163416"/>
+            <a:ext cx="1464077" cy="369332"/>
+          </a:xfrm>
+          <a:prstGeom prst="rect">
+            <a:avLst/>
+          </a:prstGeom>
+          <a:noFill/>
+        </p:spPr>
+        <p:txBody>
+          <a:bodyPr wrap="square" rtlCol="0">
+            <a:spAutoFit/>
+          </a:bodyPr>
+          <a:lstStyle/>
+          <a:p>
+            <a:r>
+              <a:rPr lang="en-US" dirty="0" err="1" smtClean="0">
+                <a:solidFill>
+                  <a:srgbClr val="FF0000"/>
+                </a:solidFill>
+              </a:rPr>
+              <a:t>Age&amp;Race</a:t>
+            </a:r>
+            <a:endParaRPr lang="en-US" dirty="0">
+              <a:solidFill>
+                <a:srgbClr val="FF0000"/>
+              </a:solidFill>
+            </a:endParaRPr>
+          </a:p>
+        </p:txBody>
+      </p:sp>
+      <p:sp>
+        <p:nvSpPr>
+          <p:cNvPr id="12" name="TextBox 11"/>
+          <p:cNvSpPr txBox="1"/>
+          <p:nvPr/>
+        </p:nvSpPr>
+        <p:spPr>
+          <a:xfrm>
+            <a:off x="3573531" y="6044099"/>
+            <a:ext cx="683393" cy="369332"/>
+          </a:xfrm>
+          <a:prstGeom prst="rect">
+            <a:avLst/>
+          </a:prstGeom>
+          <a:noFill/>
+        </p:spPr>
+        <p:txBody>
+          <a:bodyPr wrap="square" rtlCol="0">
+            <a:spAutoFit/>
+          </a:bodyPr>
+          <a:lstStyle/>
+          <a:p>
+            <a:r>
+              <a:rPr lang="en-US" dirty="0" smtClean="0">
+                <a:solidFill>
+                  <a:srgbClr val="FF0000"/>
+                </a:solidFill>
+              </a:rPr>
+              <a:t>Year</a:t>
+            </a:r>
+            <a:endParaRPr lang="en-US" dirty="0">
+              <a:solidFill>
+                <a:srgbClr val="FF0000"/>
+              </a:solidFill>
+            </a:endParaRPr>
+          </a:p>
+        </p:txBody>
+      </p:sp>
+      <p:sp>
+        <p:nvSpPr>
+          <p:cNvPr id="13" name="TextBox 12"/>
+          <p:cNvSpPr txBox="1"/>
+          <p:nvPr/>
+        </p:nvSpPr>
+        <p:spPr>
+          <a:xfrm>
+            <a:off x="1299411" y="3994484"/>
+            <a:ext cx="6814686" cy="646331"/>
+          </a:xfrm>
+          <a:prstGeom prst="rect">
+            <a:avLst/>
+          </a:prstGeom>
+          <a:noFill/>
+        </p:spPr>
+        <p:txBody>
+          <a:bodyPr wrap="square" rtlCol="0">
+            <a:spAutoFit/>
+          </a:bodyPr>
+          <a:lstStyle/>
+          <a:p>
+            <a:r>
+              <a:rPr lang="en-US" dirty="0" smtClean="0"/>
+              <a:t>Brush window in age group, will change other views;</a:t>
+            </a:r>
+          </a:p>
+          <a:p>
+            <a:r>
+              <a:rPr lang="en-US" dirty="0" smtClean="0"/>
+              <a:t>Play button can animate changes in years, 6 years </a:t>
+            </a:r>
+            <a:r>
+              <a:rPr lang="en-US" dirty="0" smtClean="0"/>
+              <a:t>data</a:t>
+            </a:r>
+            <a:endParaRPr lang="en-US" dirty="0" smtClean="0"/>
+          </a:p>
+        </p:txBody>
+      </p:sp>
+      <p:sp>
+        <p:nvSpPr>
+          <p:cNvPr id="14" name="Title 1"/>
+          <p:cNvSpPr>
+            <a:spLocks noGrp="1"/>
+          </p:cNvSpPr>
+          <p:nvPr>
+            <p:ph type="title"/>
+          </p:nvPr>
+        </p:nvSpPr>
+        <p:spPr>
+          <a:xfrm>
+            <a:off x="838200" y="0"/>
+            <a:ext cx="10515600" cy="510140"/>
+          </a:xfrm>
+        </p:spPr>
+        <p:txBody>
+          <a:bodyPr>
+            <a:noAutofit/>
+          </a:bodyPr>
+          <a:lstStyle/>
+          <a:p>
+            <a:r>
+              <a:rPr lang="en-US" sz="3200" dirty="0" smtClean="0">
+                <a:latin typeface="Rockwell" panose="02060603020205020403" pitchFamily="18" charset="0"/>
+              </a:rPr>
+              <a:t>Planned final design– 04/26/2015</a:t>
+            </a:r>
+            <a:endParaRPr lang="en-US" sz="3200" dirty="0">
+              <a:latin typeface="Rockwell" panose="02060603020205020403" pitchFamily="18" charset="0"/>
+            </a:endParaRPr>
+          </a:p>
+        </p:txBody>
+      </p:sp>
     </p:spTree>
     <p:extLst>
       <p:ext uri="{BB962C8B-B14F-4D97-AF65-F5344CB8AC3E}">
-        <p14:creationId xmlns:p14="http://schemas.microsoft.com/office/powerpoint/2010/main" val="186199193"/>
+        <p14:creationId xmlns:p14="http://schemas.microsoft.com/office/powerpoint/2010/main" val="3906189914"/>
       </p:ext>
     </p:extLst>
   </p:cSld>
@@ -7044,8 +7103,8 @@
         </p:nvSpPr>
         <p:spPr>
           <a:xfrm>
-            <a:off x="838200" y="365125"/>
-            <a:ext cx="10515600" cy="337519"/>
+            <a:off x="838200" y="365126"/>
+            <a:ext cx="10515600" cy="433772"/>
           </a:xfrm>
         </p:spPr>
         <p:txBody>
@@ -7056,114 +7115,40 @@
           <a:p>
             <a:r>
               <a:rPr lang="en-US" dirty="0" smtClean="0"/>
-              <a:t>Meta data</a:t>
+              <a:t>Questions</a:t>
             </a:r>
             <a:endParaRPr lang="en-US" dirty="0"/>
           </a:p>
         </p:txBody>
       </p:sp>
-      <p:pic>
-        <p:nvPicPr>
-          <p:cNvPr id="4" name="Content Placeholder 3"/>
-          <p:cNvPicPr>
-            <a:picLocks noGrp="1" noChangeAspect="1"/>
-          </p:cNvPicPr>
+      <p:sp>
+        <p:nvSpPr>
+          <p:cNvPr id="3" name="Content Placeholder 2"/>
+          <p:cNvSpPr>
+            <a:spLocks noGrp="1"/>
+          </p:cNvSpPr>
           <p:nvPr>
             <p:ph idx="1"/>
           </p:nvPr>
-        </p:nvPicPr>
-        <p:blipFill>
-          <a:blip r:embed="rId2"/>
-          <a:stretch>
-            <a:fillRect/>
-          </a:stretch>
-        </p:blipFill>
-        <p:spPr>
-          <a:xfrm>
-            <a:off x="1045864" y="779463"/>
-            <a:ext cx="4459787" cy="2801135"/>
-          </a:xfrm>
-          <a:prstGeom prst="rect">
-            <a:avLst/>
-          </a:prstGeom>
-        </p:spPr>
-      </p:pic>
-      <p:pic>
-        <p:nvPicPr>
-          <p:cNvPr id="5" name="Picture 4"/>
-          <p:cNvPicPr>
-            <a:picLocks noChangeAspect="1"/>
-          </p:cNvPicPr>
-          <p:nvPr/>
-        </p:nvPicPr>
-        <p:blipFill>
-          <a:blip r:embed="rId3"/>
-          <a:stretch>
-            <a:fillRect/>
-          </a:stretch>
-        </p:blipFill>
-        <p:spPr>
-          <a:xfrm>
-            <a:off x="914299" y="3580598"/>
-            <a:ext cx="4408471" cy="221564"/>
-          </a:xfrm>
-          <a:prstGeom prst="rect">
-            <a:avLst/>
-          </a:prstGeom>
-        </p:spPr>
-      </p:pic>
-      <p:pic>
-        <p:nvPicPr>
-          <p:cNvPr id="6" name="Picture 5"/>
-          <p:cNvPicPr>
-            <a:picLocks noChangeAspect="1"/>
-          </p:cNvPicPr>
-          <p:nvPr/>
-        </p:nvPicPr>
-        <p:blipFill>
-          <a:blip r:embed="rId4"/>
-          <a:stretch>
-            <a:fillRect/>
-          </a:stretch>
-        </p:blipFill>
-        <p:spPr>
-          <a:xfrm>
-            <a:off x="5938988" y="240631"/>
-            <a:ext cx="1539841" cy="6352305"/>
-          </a:xfrm>
-          <a:prstGeom prst="rect">
-            <a:avLst/>
-          </a:prstGeom>
-        </p:spPr>
-      </p:pic>
-      <p:pic>
-        <p:nvPicPr>
-          <p:cNvPr id="7" name="Picture 6"/>
-          <p:cNvPicPr>
-            <a:picLocks noChangeAspect="1"/>
-          </p:cNvPicPr>
-          <p:nvPr/>
-        </p:nvPicPr>
-        <p:blipFill>
-          <a:blip r:embed="rId5"/>
-          <a:stretch>
-            <a:fillRect/>
-          </a:stretch>
-        </p:blipFill>
-        <p:spPr>
-          <a:xfrm>
-            <a:off x="7749439" y="240631"/>
-            <a:ext cx="3333750" cy="1524000"/>
-          </a:xfrm>
-          <a:prstGeom prst="rect">
-            <a:avLst/>
-          </a:prstGeom>
-        </p:spPr>
-      </p:pic>
+        </p:nvSpPr>
+        <p:spPr>
+          <a:xfrm>
+            <a:off x="838200" y="875899"/>
+            <a:ext cx="10515600" cy="5301064"/>
+          </a:xfrm>
+        </p:spPr>
+        <p:txBody>
+          <a:bodyPr/>
+          <a:lstStyle/>
+          <a:p>
+            <a:endParaRPr lang="en-US" dirty="0"/>
+          </a:p>
+        </p:txBody>
+      </p:sp>
     </p:spTree>
     <p:extLst>
       <p:ext uri="{BB962C8B-B14F-4D97-AF65-F5344CB8AC3E}">
-        <p14:creationId xmlns:p14="http://schemas.microsoft.com/office/powerpoint/2010/main" val="2848734710"/>
+        <p14:creationId xmlns:p14="http://schemas.microsoft.com/office/powerpoint/2010/main" val="279467081"/>
       </p:ext>
     </p:extLst>
   </p:cSld>
@@ -7197,34 +7182,148 @@
           <a:chExt cx="0" cy="0"/>
         </a:xfrm>
       </p:grpSpPr>
-      <p:pic>
-        <p:nvPicPr>
-          <p:cNvPr id="6" name="Picture 5"/>
-          <p:cNvPicPr>
-            <a:picLocks noChangeAspect="1"/>
-          </p:cNvPicPr>
-          <p:nvPr/>
-        </p:nvPicPr>
-        <p:blipFill>
-          <a:blip r:embed="rId2"/>
-          <a:stretch>
-            <a:fillRect/>
-          </a:stretch>
-        </p:blipFill>
-        <p:spPr>
-          <a:xfrm>
-            <a:off x="765810" y="134753"/>
-            <a:ext cx="10312707" cy="6072237"/>
-          </a:xfrm>
-          <a:prstGeom prst="rect">
-            <a:avLst/>
-          </a:prstGeom>
-        </p:spPr>
-      </p:pic>
+      <p:sp>
+        <p:nvSpPr>
+          <p:cNvPr id="2" name="Title 1"/>
+          <p:cNvSpPr>
+            <a:spLocks noGrp="1"/>
+          </p:cNvSpPr>
+          <p:nvPr>
+            <p:ph type="title"/>
+          </p:nvPr>
+        </p:nvSpPr>
+        <p:spPr>
+          <a:xfrm>
+            <a:off x="838200" y="0"/>
+            <a:ext cx="10515600" cy="865159"/>
+          </a:xfrm>
+        </p:spPr>
+        <p:txBody>
+          <a:bodyPr>
+            <a:normAutofit/>
+          </a:bodyPr>
+          <a:lstStyle/>
+          <a:p>
+            <a:r>
+              <a:rPr lang="en-US" sz="3600" dirty="0">
+                <a:latin typeface="Rockwell" panose="02060603020205020403" pitchFamily="18" charset="0"/>
+              </a:rPr>
+              <a:t>8</a:t>
+            </a:r>
+            <a:r>
+              <a:rPr lang="en-US" sz="3600" dirty="0" smtClean="0">
+                <a:latin typeface="Rockwell" panose="02060603020205020403" pitchFamily="18" charset="0"/>
+              </a:rPr>
+              <a:t>.  Design Evolution Ideas 04/23/2015</a:t>
+            </a:r>
+            <a:endParaRPr lang="en-US" sz="3600" dirty="0">
+              <a:latin typeface="Rockwell" panose="02060603020205020403" pitchFamily="18" charset="0"/>
+            </a:endParaRPr>
+          </a:p>
+        </p:txBody>
+      </p:sp>
+      <p:sp>
+        <p:nvSpPr>
+          <p:cNvPr id="3" name="Content Placeholder 2"/>
+          <p:cNvSpPr>
+            <a:spLocks noGrp="1"/>
+          </p:cNvSpPr>
+          <p:nvPr>
+            <p:ph idx="1"/>
+          </p:nvPr>
+        </p:nvSpPr>
+        <p:spPr>
+          <a:xfrm>
+            <a:off x="838200" y="1022147"/>
+            <a:ext cx="10515600" cy="4880179"/>
+          </a:xfrm>
+        </p:spPr>
+        <p:txBody>
+          <a:bodyPr>
+            <a:normAutofit/>
+          </a:bodyPr>
+          <a:lstStyle/>
+          <a:p>
+            <a:pPr marL="0" indent="0">
+              <a:buNone/>
+            </a:pPr>
+            <a:r>
+              <a:rPr lang="en-US" sz="2000" dirty="0" smtClean="0"/>
+              <a:t>Three directions of improvement</a:t>
+            </a:r>
+          </a:p>
+          <a:p>
+            <a:r>
+              <a:rPr lang="en-US" sz="2000" dirty="0" smtClean="0"/>
+              <a:t>Depth : more resolution, showing the race(white) in county level</a:t>
+            </a:r>
+          </a:p>
+          <a:p>
+            <a:r>
+              <a:rPr lang="en-US" sz="2000" dirty="0" smtClean="0"/>
+              <a:t>Variety: drop down menu that user can see race( black, Hispanic, other) in county level</a:t>
+            </a:r>
+            <a:r>
+              <a:rPr lang="en-US" sz="2400" dirty="0" smtClean="0"/>
+              <a:t>;</a:t>
+            </a:r>
+          </a:p>
+          <a:p>
+            <a:pPr marL="0" indent="0">
+              <a:buNone/>
+            </a:pPr>
+            <a:r>
+              <a:rPr lang="en-US" sz="2400" dirty="0"/>
+              <a:t> </a:t>
+            </a:r>
+            <a:r>
+              <a:rPr lang="en-US" sz="2400" dirty="0" smtClean="0"/>
+              <a:t>             : year slide bar—animation</a:t>
+            </a:r>
+          </a:p>
+          <a:p>
+            <a:r>
+              <a:rPr lang="en-US" sz="2400" dirty="0" smtClean="0"/>
+              <a:t>Brush function, </a:t>
+            </a:r>
+          </a:p>
+          <a:p>
+            <a:r>
+              <a:rPr lang="en-US" sz="2400" dirty="0" err="1" smtClean="0"/>
+              <a:t>Treemap</a:t>
+            </a:r>
+            <a:r>
+              <a:rPr lang="en-US" sz="2400" dirty="0" smtClean="0"/>
+              <a:t> will get updated in different years as well : </a:t>
+            </a:r>
+            <a:r>
+              <a:rPr lang="en-US" sz="2400" dirty="0" err="1" smtClean="0"/>
+              <a:t>treemap</a:t>
+            </a:r>
+            <a:r>
+              <a:rPr lang="en-US" sz="2400" dirty="0" smtClean="0"/>
+              <a:t> takes care of total pop, race</a:t>
+            </a:r>
+          </a:p>
+          <a:p>
+            <a:r>
+              <a:rPr lang="en-US" sz="2400" dirty="0" smtClean="0"/>
+              <a:t>Pop map takes care of race</a:t>
+            </a:r>
+          </a:p>
+          <a:p>
+            <a:r>
+              <a:rPr lang="en-US" sz="2400" dirty="0" smtClean="0"/>
+              <a:t>Sex gender is shown already</a:t>
+            </a:r>
+            <a:endParaRPr lang="en-US" sz="2000" dirty="0" smtClean="0"/>
+          </a:p>
+        </p:txBody>
+      </p:sp>
     </p:spTree>
     <p:extLst>
       <p:ext uri="{BB962C8B-B14F-4D97-AF65-F5344CB8AC3E}">
-        <p14:creationId xmlns:p14="http://schemas.microsoft.com/office/powerpoint/2010/main" val="2982902558"/>
+        <p14:creationId xmlns:p14="http://schemas.microsoft.com/office/powerpoint/2010/main" val="3523346248"/>
       </p:ext>
     </p:extLst>
   </p:cSld>
@@ -7268,6 +7367,338 @@
             <p:ph type="title"/>
           </p:nvPr>
         </p:nvSpPr>
+        <p:spPr/>
+        <p:txBody>
+          <a:bodyPr>
+            <a:noAutofit/>
+          </a:bodyPr>
+          <a:lstStyle/>
+          <a:p>
+            <a:r>
+              <a:rPr lang="en-US" sz="2800" dirty="0"/>
+              <a:t>New data source– completed version</a:t>
+            </a:r>
+            <a:br>
+              <a:rPr lang="en-US" sz="2800" dirty="0"/>
+            </a:br>
+            <a:r>
+              <a:rPr lang="en-US" sz="2800" dirty="0"/>
+              <a:t>County Characteristics Datasets: Annual County Resident Population Estimates by Age, Sex, Race, and Hispanic Origin: </a:t>
+            </a:r>
+            <a:r>
+              <a:rPr lang="en-US" sz="2800" dirty="0" smtClean="0"/>
+              <a:t>April 2010 </a:t>
+            </a:r>
+            <a:r>
+              <a:rPr lang="en-US" sz="2800" dirty="0"/>
+              <a:t>to </a:t>
+            </a:r>
+            <a:r>
+              <a:rPr lang="en-US" sz="2800" dirty="0" smtClean="0"/>
+              <a:t>July 2013</a:t>
+            </a:r>
+            <a:endParaRPr lang="en-US" sz="2800" dirty="0"/>
+          </a:p>
+        </p:txBody>
+      </p:sp>
+      <p:sp>
+        <p:nvSpPr>
+          <p:cNvPr id="3" name="Content Placeholder 2"/>
+          <p:cNvSpPr>
+            <a:spLocks noGrp="1"/>
+          </p:cNvSpPr>
+          <p:nvPr>
+            <p:ph idx="1"/>
+          </p:nvPr>
+        </p:nvSpPr>
+        <p:spPr>
+          <a:xfrm>
+            <a:off x="838200" y="1690688"/>
+            <a:ext cx="10515600" cy="4486275"/>
+          </a:xfrm>
+        </p:spPr>
+        <p:txBody>
+          <a:bodyPr/>
+          <a:lstStyle/>
+          <a:p>
+            <a:r>
+              <a:rPr lang="en-US" sz="2000" dirty="0">
+                <a:hlinkClick r:id="rId2"/>
+              </a:rPr>
+              <a:t>http://</a:t>
+            </a:r>
+            <a:r>
+              <a:rPr lang="en-US" sz="2000" dirty="0" smtClean="0">
+                <a:hlinkClick r:id="rId2"/>
+              </a:rPr>
+              <a:t>www.census.gov/popest/data/counties/asrh/2013/CC-EST2013-ALLDATA.html</a:t>
+            </a:r>
+            <a:endParaRPr lang="en-US" sz="2000" dirty="0" smtClean="0"/>
+          </a:p>
+          <a:p>
+            <a:r>
+              <a:rPr lang="en-US" sz="2000" dirty="0"/>
+              <a:t>Optional data 2 </a:t>
+            </a:r>
+            <a:r>
+              <a:rPr lang="en-US" sz="2000" dirty="0">
+                <a:hlinkClick r:id="rId3"/>
+              </a:rPr>
+              <a:t>http://</a:t>
+            </a:r>
+            <a:r>
+              <a:rPr lang="en-US" sz="2000" dirty="0" smtClean="0">
+                <a:hlinkClick r:id="rId3"/>
+              </a:rPr>
+              <a:t>www.census.gov/did/www/saipe/data/statecounty/data/2008.html</a:t>
+            </a:r>
+            <a:endParaRPr lang="en-US" sz="2000" dirty="0" smtClean="0"/>
+          </a:p>
+          <a:p>
+            <a:r>
+              <a:rPr lang="en-US" sz="1800" dirty="0" smtClean="0"/>
+              <a:t>Data screen shot</a:t>
+            </a:r>
+            <a:endParaRPr lang="en-US" sz="1800" dirty="0"/>
+          </a:p>
+        </p:txBody>
+      </p:sp>
+      <p:pic>
+        <p:nvPicPr>
+          <p:cNvPr id="4" name="Picture 3"/>
+          <p:cNvPicPr>
+            <a:picLocks noChangeAspect="1"/>
+          </p:cNvPicPr>
+          <p:nvPr/>
+        </p:nvPicPr>
+        <p:blipFill>
+          <a:blip r:embed="rId4"/>
+          <a:stretch>
+            <a:fillRect/>
+          </a:stretch>
+        </p:blipFill>
+        <p:spPr>
+          <a:xfrm>
+            <a:off x="192505" y="2772076"/>
+            <a:ext cx="12146857" cy="3903044"/>
+          </a:xfrm>
+          <a:prstGeom prst="rect">
+            <a:avLst/>
+          </a:prstGeom>
+        </p:spPr>
+      </p:pic>
+    </p:spTree>
+    <p:extLst>
+      <p:ext uri="{BB962C8B-B14F-4D97-AF65-F5344CB8AC3E}">
+        <p14:creationId xmlns:p14="http://schemas.microsoft.com/office/powerpoint/2010/main" val="186199193"/>
+      </p:ext>
+    </p:extLst>
+  </p:cSld>
+  <p:clrMapOvr>
+    <a:masterClrMapping/>
+  </p:clrMapOvr>
+  <p:timing>
+    <p:tnLst>
+      <p:par>
+        <p:cTn id="1" dur="indefinite" restart="never" nodeType="tmRoot"/>
+      </p:par>
+    </p:tnLst>
+  </p:timing>
+</p:sld>
+</file>
+
+<file path=ppt/slides/slide24.xml><?xml version="1.0" encoding="utf-8"?>
+<p:sld xmlns:a="http://schemas.openxmlformats.org/drawingml/2006/main" xmlns:r="http://schemas.openxmlformats.org/officeDocument/2006/relationships" xmlns:p="http://schemas.openxmlformats.org/presentationml/2006/main">
+  <p:cSld>
+    <p:spTree>
+      <p:nvGrpSpPr>
+        <p:cNvPr id="1" name=""/>
+        <p:cNvGrpSpPr/>
+        <p:nvPr/>
+      </p:nvGrpSpPr>
+      <p:grpSpPr>
+        <a:xfrm>
+          <a:off x="0" y="0"/>
+          <a:ext cx="0" cy="0"/>
+          <a:chOff x="0" y="0"/>
+          <a:chExt cx="0" cy="0"/>
+        </a:xfrm>
+      </p:grpSpPr>
+      <p:sp>
+        <p:nvSpPr>
+          <p:cNvPr id="2" name="Title 1"/>
+          <p:cNvSpPr>
+            <a:spLocks noGrp="1"/>
+          </p:cNvSpPr>
+          <p:nvPr>
+            <p:ph type="title"/>
+          </p:nvPr>
+        </p:nvSpPr>
+        <p:spPr>
+          <a:xfrm>
+            <a:off x="838200" y="365125"/>
+            <a:ext cx="10515600" cy="337519"/>
+          </a:xfrm>
+        </p:spPr>
+        <p:txBody>
+          <a:bodyPr>
+            <a:normAutofit fontScale="90000"/>
+          </a:bodyPr>
+          <a:lstStyle/>
+          <a:p>
+            <a:r>
+              <a:rPr lang="en-US" dirty="0" smtClean="0"/>
+              <a:t>Meta data</a:t>
+            </a:r>
+            <a:endParaRPr lang="en-US" dirty="0"/>
+          </a:p>
+        </p:txBody>
+      </p:sp>
+      <p:pic>
+        <p:nvPicPr>
+          <p:cNvPr id="4" name="Content Placeholder 3"/>
+          <p:cNvPicPr>
+            <a:picLocks noGrp="1" noChangeAspect="1"/>
+          </p:cNvPicPr>
+          <p:nvPr>
+            <p:ph idx="1"/>
+          </p:nvPr>
+        </p:nvPicPr>
+        <p:blipFill>
+          <a:blip r:embed="rId2"/>
+          <a:stretch>
+            <a:fillRect/>
+          </a:stretch>
+        </p:blipFill>
+        <p:spPr>
+          <a:xfrm>
+            <a:off x="1045864" y="779463"/>
+            <a:ext cx="4459787" cy="2801135"/>
+          </a:xfrm>
+          <a:prstGeom prst="rect">
+            <a:avLst/>
+          </a:prstGeom>
+        </p:spPr>
+      </p:pic>
+      <p:pic>
+        <p:nvPicPr>
+          <p:cNvPr id="5" name="Picture 4"/>
+          <p:cNvPicPr>
+            <a:picLocks noChangeAspect="1"/>
+          </p:cNvPicPr>
+          <p:nvPr/>
+        </p:nvPicPr>
+        <p:blipFill>
+          <a:blip r:embed="rId3"/>
+          <a:stretch>
+            <a:fillRect/>
+          </a:stretch>
+        </p:blipFill>
+        <p:spPr>
+          <a:xfrm>
+            <a:off x="914299" y="3580598"/>
+            <a:ext cx="4408471" cy="221564"/>
+          </a:xfrm>
+          <a:prstGeom prst="rect">
+            <a:avLst/>
+          </a:prstGeom>
+        </p:spPr>
+      </p:pic>
+      <p:pic>
+        <p:nvPicPr>
+          <p:cNvPr id="6" name="Picture 5"/>
+          <p:cNvPicPr>
+            <a:picLocks noChangeAspect="1"/>
+          </p:cNvPicPr>
+          <p:nvPr/>
+        </p:nvPicPr>
+        <p:blipFill>
+          <a:blip r:embed="rId4"/>
+          <a:stretch>
+            <a:fillRect/>
+          </a:stretch>
+        </p:blipFill>
+        <p:spPr>
+          <a:xfrm>
+            <a:off x="5938988" y="240631"/>
+            <a:ext cx="1539841" cy="6352305"/>
+          </a:xfrm>
+          <a:prstGeom prst="rect">
+            <a:avLst/>
+          </a:prstGeom>
+        </p:spPr>
+      </p:pic>
+      <p:pic>
+        <p:nvPicPr>
+          <p:cNvPr id="7" name="Picture 6"/>
+          <p:cNvPicPr>
+            <a:picLocks noChangeAspect="1"/>
+          </p:cNvPicPr>
+          <p:nvPr/>
+        </p:nvPicPr>
+        <p:blipFill>
+          <a:blip r:embed="rId5"/>
+          <a:stretch>
+            <a:fillRect/>
+          </a:stretch>
+        </p:blipFill>
+        <p:spPr>
+          <a:xfrm>
+            <a:off x="7749439" y="240631"/>
+            <a:ext cx="3333750" cy="1524000"/>
+          </a:xfrm>
+          <a:prstGeom prst="rect">
+            <a:avLst/>
+          </a:prstGeom>
+        </p:spPr>
+      </p:pic>
+    </p:spTree>
+    <p:extLst>
+      <p:ext uri="{BB962C8B-B14F-4D97-AF65-F5344CB8AC3E}">
+        <p14:creationId xmlns:p14="http://schemas.microsoft.com/office/powerpoint/2010/main" val="2848734710"/>
+      </p:ext>
+    </p:extLst>
+  </p:cSld>
+  <p:clrMapOvr>
+    <a:masterClrMapping/>
+  </p:clrMapOvr>
+  <p:timing>
+    <p:tnLst>
+      <p:par>
+        <p:cTn id="1" dur="indefinite" restart="never" nodeType="tmRoot"/>
+      </p:par>
+    </p:tnLst>
+  </p:timing>
+</p:sld>
+</file>
+
+<file path=ppt/slides/slide25.xml><?xml version="1.0" encoding="utf-8"?>
+<p:sld xmlns:a="http://schemas.openxmlformats.org/drawingml/2006/main" xmlns:r="http://schemas.openxmlformats.org/officeDocument/2006/relationships" xmlns:p="http://schemas.openxmlformats.org/presentationml/2006/main">
+  <p:cSld>
+    <p:spTree>
+      <p:nvGrpSpPr>
+        <p:cNvPr id="1" name=""/>
+        <p:cNvGrpSpPr/>
+        <p:nvPr/>
+      </p:nvGrpSpPr>
+      <p:grpSpPr>
+        <a:xfrm>
+          <a:off x="0" y="0"/>
+          <a:ext cx="0" cy="0"/>
+          <a:chOff x="0" y="0"/>
+          <a:chExt cx="0" cy="0"/>
+        </a:xfrm>
+      </p:grpSpPr>
+      <p:sp>
+        <p:nvSpPr>
+          <p:cNvPr id="2" name="Title 1"/>
+          <p:cNvSpPr>
+            <a:spLocks noGrp="1"/>
+          </p:cNvSpPr>
+          <p:nvPr>
+            <p:ph type="title"/>
+          </p:nvPr>
+        </p:nvSpPr>
         <p:spPr>
           <a:xfrm>
             <a:off x="838200" y="365126"/>
@@ -7406,7 +7837,7 @@
 </p:sld>
 </file>
 
-<file path=ppt/slides/slide24.xml><?xml version="1.0" encoding="utf-8"?>
+<file path=ppt/slides/slide26.xml><?xml version="1.0" encoding="utf-8"?>
 <p:sld xmlns:a="http://schemas.openxmlformats.org/drawingml/2006/main" xmlns:r="http://schemas.openxmlformats.org/officeDocument/2006/relationships" xmlns:p="http://schemas.openxmlformats.org/presentationml/2006/main">
   <p:cSld>
     <p:spTree>

</xml_diff>